<commit_message>
After Aashutosh Agarwal's feedback on updating additional details
</commit_message>
<xml_diff>
--- a/Strategic Ad Experience Optimization for Snapchat.pptx
+++ b/Strategic Ad Experience Optimization for Snapchat.pptx
@@ -8,8 +8,10 @@
     <p:sldId id="256" r:id="rId2"/>
     <p:sldId id="257" r:id="rId3"/>
     <p:sldId id="258" r:id="rId4"/>
-    <p:sldId id="259" r:id="rId5"/>
-    <p:sldId id="260" r:id="rId6"/>
+    <p:sldId id="262" r:id="rId5"/>
+    <p:sldId id="259" r:id="rId6"/>
+    <p:sldId id="261" r:id="rId7"/>
+    <p:sldId id="260" r:id="rId8"/>
   </p:sldIdLst>
   <p:sldSz cx="12192000" cy="6858000"/>
   <p:notesSz cx="6858000" cy="9144000"/>
@@ -119,7 +121,7 @@
 <file path=ppt/revisionInfo.xml><?xml version="1.0" encoding="utf-8"?>
 <p1510:revInfo xmlns:a="http://schemas.openxmlformats.org/drawingml/2006/main" xmlns:r="http://schemas.openxmlformats.org/officeDocument/2006/relationships" xmlns:p1510="http://schemas.microsoft.com/office/powerpoint/2015/10/main">
   <p1510:revLst>
-    <p1510:client id="{EC46B084-59D0-4F2D-947D-5BCE3BE97355}" v="61" dt="2025-05-20T04:58:45.114"/>
+    <p1510:client id="{EC46B084-59D0-4F2D-947D-5BCE3BE97355}" v="80" dt="2025-06-11T00:43:45.233"/>
   </p1510:revLst>
 </p1510:revInfo>
 </file>
@@ -128,8 +130,8 @@
 <pc:chgInfo xmlns:a="http://schemas.openxmlformats.org/drawingml/2006/main" xmlns:r="http://schemas.openxmlformats.org/officeDocument/2006/relationships" xmlns:ac="http://schemas.microsoft.com/office/drawing/2013/main/command" xmlns:pc="http://schemas.microsoft.com/office/powerpoint/2013/main/command">
   <pc:docChgLst>
     <pc:chgData name="Dave H" userId="6e4cc4a2bf18343d" providerId="LiveId" clId="{EC46B084-59D0-4F2D-947D-5BCE3BE97355}"/>
-    <pc:docChg chg="undo custSel addSld modSld">
-      <pc:chgData name="Dave H" userId="6e4cc4a2bf18343d" providerId="LiveId" clId="{EC46B084-59D0-4F2D-947D-5BCE3BE97355}" dt="2025-05-20T04:59:26.215" v="297" actId="13926"/>
+    <pc:docChg chg="undo custSel addSld delSld modSld sldOrd">
+      <pc:chgData name="Dave H" userId="6e4cc4a2bf18343d" providerId="LiveId" clId="{EC46B084-59D0-4F2D-947D-5BCE3BE97355}" dt="2025-06-11T00:44:21.001" v="571" actId="1076"/>
       <pc:docMkLst>
         <pc:docMk/>
       </pc:docMkLst>
@@ -178,38 +180,6 @@
             <ac:spMk id="8" creationId="{F7170D06-BA92-0BB3-0294-29F7812A4434}"/>
           </ac:spMkLst>
         </pc:spChg>
-        <pc:spChg chg="add del">
-          <ac:chgData name="Dave H" userId="6e4cc4a2bf18343d" providerId="LiveId" clId="{EC46B084-59D0-4F2D-947D-5BCE3BE97355}" dt="2025-05-20T04:16:54.257" v="31" actId="26606"/>
-          <ac:spMkLst>
-            <pc:docMk/>
-            <pc:sldMk cId="1115494158" sldId="257"/>
-            <ac:spMk id="12" creationId="{B937640E-EF7A-4A6C-A950-D12B7D5C923E}"/>
-          </ac:spMkLst>
-        </pc:spChg>
-        <pc:spChg chg="add del">
-          <ac:chgData name="Dave H" userId="6e4cc4a2bf18343d" providerId="LiveId" clId="{EC46B084-59D0-4F2D-947D-5BCE3BE97355}" dt="2025-05-20T04:16:54.257" v="31" actId="26606"/>
-          <ac:spMkLst>
-            <pc:docMk/>
-            <pc:sldMk cId="1115494158" sldId="257"/>
-            <ac:spMk id="14" creationId="{876BDF4D-4826-490A-8307-7247A295E282}"/>
-          </ac:spMkLst>
-        </pc:spChg>
-        <pc:spChg chg="add del">
-          <ac:chgData name="Dave H" userId="6e4cc4a2bf18343d" providerId="LiveId" clId="{EC46B084-59D0-4F2D-947D-5BCE3BE97355}" dt="2025-05-20T04:16:54.257" v="31" actId="26606"/>
-          <ac:spMkLst>
-            <pc:docMk/>
-            <pc:sldMk cId="1115494158" sldId="257"/>
-            <ac:spMk id="16" creationId="{2E0FF4CF-25CB-4537-9BBF-28B36C76BEED}"/>
-          </ac:spMkLst>
-        </pc:spChg>
-        <pc:picChg chg="add mod">
-          <ac:chgData name="Dave H" userId="6e4cc4a2bf18343d" providerId="LiveId" clId="{EC46B084-59D0-4F2D-947D-5BCE3BE97355}" dt="2025-05-20T04:16:54.504" v="33" actId="931"/>
-          <ac:picMkLst>
-            <pc:docMk/>
-            <pc:sldMk cId="1115494158" sldId="257"/>
-            <ac:picMk id="7" creationId="{2578A9D4-E5FE-AF99-309D-AC1D3BC2A2B1}"/>
-          </ac:picMkLst>
-        </pc:picChg>
         <pc:picChg chg="add mod ord">
           <ac:chgData name="Dave H" userId="6e4cc4a2bf18343d" providerId="LiveId" clId="{EC46B084-59D0-4F2D-947D-5BCE3BE97355}" dt="2025-05-20T04:19:00.406" v="55" actId="171"/>
           <ac:picMkLst>
@@ -220,7 +190,7 @@
         </pc:picChg>
       </pc:sldChg>
       <pc:sldChg chg="addSp modSp new mod setBg modAnim">
-        <pc:chgData name="Dave H" userId="6e4cc4a2bf18343d" providerId="LiveId" clId="{EC46B084-59D0-4F2D-947D-5BCE3BE97355}" dt="2025-05-20T04:58:41.901" v="292"/>
+        <pc:chgData name="Dave H" userId="6e4cc4a2bf18343d" providerId="LiveId" clId="{EC46B084-59D0-4F2D-947D-5BCE3BE97355}" dt="2025-06-11T00:44:21.001" v="571" actId="1076"/>
         <pc:sldMkLst>
           <pc:docMk/>
           <pc:sldMk cId="1704761155" sldId="258"/>
@@ -250,7 +220,7 @@
           </ac:spMkLst>
         </pc:spChg>
         <pc:picChg chg="add mod">
-          <ac:chgData name="Dave H" userId="6e4cc4a2bf18343d" providerId="LiveId" clId="{EC46B084-59D0-4F2D-947D-5BCE3BE97355}" dt="2025-05-20T04:22:05.493" v="82" actId="14100"/>
+          <ac:chgData name="Dave H" userId="6e4cc4a2bf18343d" providerId="LiveId" clId="{EC46B084-59D0-4F2D-947D-5BCE3BE97355}" dt="2025-06-11T00:44:21.001" v="571" actId="1076"/>
           <ac:picMkLst>
             <pc:docMk/>
             <pc:sldMk cId="1704761155" sldId="258"/>
@@ -288,14 +258,6 @@
             <ac:spMk id="4" creationId="{495E101B-7C40-7444-3819-405E9B3E54FB}"/>
           </ac:spMkLst>
         </pc:spChg>
-        <pc:graphicFrameChg chg="add del mod">
-          <ac:chgData name="Dave H" userId="6e4cc4a2bf18343d" providerId="LiveId" clId="{EC46B084-59D0-4F2D-947D-5BCE3BE97355}" dt="2025-05-20T04:31:05.688" v="100" actId="478"/>
-          <ac:graphicFrameMkLst>
-            <pc:docMk/>
-            <pc:sldMk cId="1560101455" sldId="259"/>
-            <ac:graphicFrameMk id="8" creationId="{62506D53-558A-925B-D45E-AE7C094573E4}"/>
-          </ac:graphicFrameMkLst>
-        </pc:graphicFrameChg>
         <pc:picChg chg="add mod">
           <ac:chgData name="Dave H" userId="6e4cc4a2bf18343d" providerId="LiveId" clId="{EC46B084-59D0-4F2D-947D-5BCE3BE97355}" dt="2025-05-20T04:31:57.924" v="116" actId="1076"/>
           <ac:picMkLst>
@@ -327,30 +289,6 @@
             <ac:spMk id="3" creationId="{BD6DF59D-951C-3AB6-92C9-43EB094CFD37}"/>
           </ac:spMkLst>
         </pc:spChg>
-        <pc:spChg chg="add">
-          <ac:chgData name="Dave H" userId="6e4cc4a2bf18343d" providerId="LiveId" clId="{EC46B084-59D0-4F2D-947D-5BCE3BE97355}" dt="2025-05-20T04:45:45.042" v="133"/>
-          <ac:spMkLst>
-            <pc:docMk/>
-            <pc:sldMk cId="2125564926" sldId="260"/>
-            <ac:spMk id="4" creationId="{5A9E4AC6-0BCD-84E8-4D4E-F77227C67387}"/>
-          </ac:spMkLst>
-        </pc:spChg>
-        <pc:spChg chg="add">
-          <ac:chgData name="Dave H" userId="6e4cc4a2bf18343d" providerId="LiveId" clId="{EC46B084-59D0-4F2D-947D-5BCE3BE97355}" dt="2025-05-20T04:45:47.652" v="135"/>
-          <ac:spMkLst>
-            <pc:docMk/>
-            <pc:sldMk cId="2125564926" sldId="260"/>
-            <ac:spMk id="5" creationId="{0D734D83-C790-45B6-9550-EA51548D9CB6}"/>
-          </ac:spMkLst>
-        </pc:spChg>
-        <pc:spChg chg="add mod">
-          <ac:chgData name="Dave H" userId="6e4cc4a2bf18343d" providerId="LiveId" clId="{EC46B084-59D0-4F2D-947D-5BCE3BE97355}" dt="2025-05-20T04:46:07.062" v="139" actId="1076"/>
-          <ac:spMkLst>
-            <pc:docMk/>
-            <pc:sldMk cId="2125564926" sldId="260"/>
-            <ac:spMk id="6" creationId="{30B746D2-5468-8FFC-C3F7-D495A2880B84}"/>
-          </ac:spMkLst>
-        </pc:spChg>
         <pc:spChg chg="add mod">
           <ac:chgData name="Dave H" userId="6e4cc4a2bf18343d" providerId="LiveId" clId="{EC46B084-59D0-4F2D-947D-5BCE3BE97355}" dt="2025-05-20T04:49:27.752" v="276"/>
           <ac:spMkLst>
@@ -359,6 +297,179 @@
             <ac:spMk id="7" creationId="{82391853-F60B-256B-5AEB-0C57AD152771}"/>
           </ac:spMkLst>
         </pc:spChg>
+      </pc:sldChg>
+      <pc:sldChg chg="addSp delSp modSp new mod setBg modAnim">
+        <pc:chgData name="Dave H" userId="6e4cc4a2bf18343d" providerId="LiveId" clId="{EC46B084-59D0-4F2D-947D-5BCE3BE97355}" dt="2025-06-11T00:43:45.233" v="570"/>
+        <pc:sldMkLst>
+          <pc:docMk/>
+          <pc:sldMk cId="1441263603" sldId="261"/>
+        </pc:sldMkLst>
+        <pc:spChg chg="mod">
+          <ac:chgData name="Dave H" userId="6e4cc4a2bf18343d" providerId="LiveId" clId="{EC46B084-59D0-4F2D-947D-5BCE3BE97355}" dt="2025-06-11T00:04:51.019" v="415" actId="255"/>
+          <ac:spMkLst>
+            <pc:docMk/>
+            <pc:sldMk cId="1441263603" sldId="261"/>
+            <ac:spMk id="2" creationId="{C5ECAA2F-6643-D354-4FDA-460322C740EF}"/>
+          </ac:spMkLst>
+        </pc:spChg>
+        <pc:spChg chg="del mod">
+          <ac:chgData name="Dave H" userId="6e4cc4a2bf18343d" providerId="LiveId" clId="{EC46B084-59D0-4F2D-947D-5BCE3BE97355}" dt="2025-06-10T23:27:46.786" v="318" actId="478"/>
+          <ac:spMkLst>
+            <pc:docMk/>
+            <pc:sldMk cId="1441263603" sldId="261"/>
+            <ac:spMk id="3" creationId="{AF42B941-F30B-C56B-84E9-31788D9310DE}"/>
+          </ac:spMkLst>
+        </pc:spChg>
+        <pc:spChg chg="add mod">
+          <ac:chgData name="Dave H" userId="6e4cc4a2bf18343d" providerId="LiveId" clId="{EC46B084-59D0-4F2D-947D-5BCE3BE97355}" dt="2025-06-10T23:30:18.695" v="319"/>
+          <ac:spMkLst>
+            <pc:docMk/>
+            <pc:sldMk cId="1441263603" sldId="261"/>
+            <ac:spMk id="4" creationId="{11D9C691-50B9-3D28-15E1-C0A077FD3E4C}"/>
+          </ac:spMkLst>
+        </pc:spChg>
+        <pc:spChg chg="add mod">
+          <ac:chgData name="Dave H" userId="6e4cc4a2bf18343d" providerId="LiveId" clId="{EC46B084-59D0-4F2D-947D-5BCE3BE97355}" dt="2025-06-11T00:04:46.978" v="414" actId="255"/>
+          <ac:spMkLst>
+            <pc:docMk/>
+            <pc:sldMk cId="1441263603" sldId="261"/>
+            <ac:spMk id="12" creationId="{F26DF9DC-CE5E-ABA5-660D-F0258AE6C592}"/>
+          </ac:spMkLst>
+        </pc:spChg>
+        <pc:graphicFrameChg chg="add del mod">
+          <ac:chgData name="Dave H" userId="6e4cc4a2bf18343d" providerId="LiveId" clId="{EC46B084-59D0-4F2D-947D-5BCE3BE97355}" dt="2025-06-10T23:32:22.777" v="336" actId="478"/>
+          <ac:graphicFrameMkLst>
+            <pc:docMk/>
+            <pc:sldMk cId="1441263603" sldId="261"/>
+            <ac:graphicFrameMk id="7" creationId="{3813174B-FF2A-E575-158F-0BC4652644F5}"/>
+          </ac:graphicFrameMkLst>
+        </pc:graphicFrameChg>
+        <pc:picChg chg="add mod">
+          <ac:chgData name="Dave H" userId="6e4cc4a2bf18343d" providerId="LiveId" clId="{EC46B084-59D0-4F2D-947D-5BCE3BE97355}" dt="2025-06-11T00:43:35.450" v="567" actId="1076"/>
+          <ac:picMkLst>
+            <pc:docMk/>
+            <pc:sldMk cId="1441263603" sldId="261"/>
+            <ac:picMk id="9" creationId="{E19876F5-8638-8A47-AB5E-366C9D0DF2B0}"/>
+          </ac:picMkLst>
+        </pc:picChg>
+        <pc:picChg chg="add del mod">
+          <ac:chgData name="Dave H" userId="6e4cc4a2bf18343d" providerId="LiveId" clId="{EC46B084-59D0-4F2D-947D-5BCE3BE97355}" dt="2025-06-10T23:38:13.528" v="355" actId="478"/>
+          <ac:picMkLst>
+            <pc:docMk/>
+            <pc:sldMk cId="1441263603" sldId="261"/>
+            <ac:picMk id="11" creationId="{FCBF98E7-3DB0-1359-53B6-55AFC711CD2D}"/>
+          </ac:picMkLst>
+        </pc:picChg>
+        <pc:picChg chg="add mod">
+          <ac:chgData name="Dave H" userId="6e4cc4a2bf18343d" providerId="LiveId" clId="{EC46B084-59D0-4F2D-947D-5BCE3BE97355}" dt="2025-06-11T00:04:55.565" v="416" actId="1076"/>
+          <ac:picMkLst>
+            <pc:docMk/>
+            <pc:sldMk cId="1441263603" sldId="261"/>
+            <ac:picMk id="14" creationId="{038E826F-2DC5-B5CA-FA13-998FE2FA5767}"/>
+          </ac:picMkLst>
+        </pc:picChg>
+        <pc:picChg chg="add mod">
+          <ac:chgData name="Dave H" userId="6e4cc4a2bf18343d" providerId="LiveId" clId="{EC46B084-59D0-4F2D-947D-5BCE3BE97355}" dt="2025-06-10T23:41:57.976" v="404" actId="1076"/>
+          <ac:picMkLst>
+            <pc:docMk/>
+            <pc:sldMk cId="1441263603" sldId="261"/>
+            <ac:picMk id="16" creationId="{B5F2E82F-B5AD-CEFE-6D52-3DCA58A85849}"/>
+          </ac:picMkLst>
+        </pc:picChg>
+      </pc:sldChg>
+      <pc:sldChg chg="addSp delSp modSp new del mod ord setBg">
+        <pc:chgData name="Dave H" userId="6e4cc4a2bf18343d" providerId="LiveId" clId="{EC46B084-59D0-4F2D-947D-5BCE3BE97355}" dt="2025-06-11T00:07:04.792" v="418" actId="47"/>
+        <pc:sldMkLst>
+          <pc:docMk/>
+          <pc:sldMk cId="214974240" sldId="262"/>
+        </pc:sldMkLst>
+        <pc:spChg chg="del mod">
+          <ac:chgData name="Dave H" userId="6e4cc4a2bf18343d" providerId="LiveId" clId="{EC46B084-59D0-4F2D-947D-5BCE3BE97355}" dt="2025-06-10T23:46:14.968" v="410" actId="478"/>
+          <ac:spMkLst>
+            <pc:docMk/>
+            <pc:sldMk cId="214974240" sldId="262"/>
+            <ac:spMk id="3" creationId="{19481D83-0305-2694-9544-7CB97E8C3405}"/>
+          </ac:spMkLst>
+        </pc:spChg>
+        <pc:spChg chg="add mod">
+          <ac:chgData name="Dave H" userId="6e4cc4a2bf18343d" providerId="LiveId" clId="{EC46B084-59D0-4F2D-947D-5BCE3BE97355}" dt="2025-06-10T23:46:16.195" v="411"/>
+          <ac:spMkLst>
+            <pc:docMk/>
+            <pc:sldMk cId="214974240" sldId="262"/>
+            <ac:spMk id="4" creationId="{D766C5AE-3BF6-8B77-42F8-9A54FF91D7C3}"/>
+          </ac:spMkLst>
+        </pc:spChg>
+      </pc:sldChg>
+      <pc:sldChg chg="addSp delSp modSp new mod setBg modAnim">
+        <pc:chgData name="Dave H" userId="6e4cc4a2bf18343d" providerId="LiveId" clId="{EC46B084-59D0-4F2D-947D-5BCE3BE97355}" dt="2025-06-11T00:42:53.536" v="565"/>
+        <pc:sldMkLst>
+          <pc:docMk/>
+          <pc:sldMk cId="3217958544" sldId="262"/>
+        </pc:sldMkLst>
+        <pc:spChg chg="del mod">
+          <ac:chgData name="Dave H" userId="6e4cc4a2bf18343d" providerId="LiveId" clId="{EC46B084-59D0-4F2D-947D-5BCE3BE97355}" dt="2025-06-11T00:16:27.961" v="450" actId="478"/>
+          <ac:spMkLst>
+            <pc:docMk/>
+            <pc:sldMk cId="3217958544" sldId="262"/>
+            <ac:spMk id="2" creationId="{FB5DD874-76E9-7380-AEA0-1567F36D2BE7}"/>
+          </ac:spMkLst>
+        </pc:spChg>
+        <pc:spChg chg="del">
+          <ac:chgData name="Dave H" userId="6e4cc4a2bf18343d" providerId="LiveId" clId="{EC46B084-59D0-4F2D-947D-5BCE3BE97355}" dt="2025-06-11T00:16:32.353" v="451" actId="478"/>
+          <ac:spMkLst>
+            <pc:docMk/>
+            <pc:sldMk cId="3217958544" sldId="262"/>
+            <ac:spMk id="3" creationId="{50064F80-3501-3C92-B833-56A7954AA69C}"/>
+          </ac:spMkLst>
+        </pc:spChg>
+        <pc:spChg chg="add mod">
+          <ac:chgData name="Dave H" userId="6e4cc4a2bf18343d" providerId="LiveId" clId="{EC46B084-59D0-4F2D-947D-5BCE3BE97355}" dt="2025-06-11T00:07:28.974" v="421"/>
+          <ac:spMkLst>
+            <pc:docMk/>
+            <pc:sldMk cId="3217958544" sldId="262"/>
+            <ac:spMk id="4" creationId="{BC6A284B-4D68-C738-0380-689D5C5D7F0D}"/>
+          </ac:spMkLst>
+        </pc:spChg>
+        <pc:spChg chg="add del mod">
+          <ac:chgData name="Dave H" userId="6e4cc4a2bf18343d" providerId="LiveId" clId="{EC46B084-59D0-4F2D-947D-5BCE3BE97355}" dt="2025-06-11T00:20:49.514" v="456"/>
+          <ac:spMkLst>
+            <pc:docMk/>
+            <pc:sldMk cId="3217958544" sldId="262"/>
+            <ac:spMk id="7" creationId="{2DFAB3AF-FA0E-A274-1A01-64BF02C6DBF6}"/>
+          </ac:spMkLst>
+        </pc:spChg>
+        <pc:spChg chg="add mod">
+          <ac:chgData name="Dave H" userId="6e4cc4a2bf18343d" providerId="LiveId" clId="{EC46B084-59D0-4F2D-947D-5BCE3BE97355}" dt="2025-06-11T00:30:43.119" v="563"/>
+          <ac:spMkLst>
+            <pc:docMk/>
+            <pc:sldMk cId="3217958544" sldId="262"/>
+            <ac:spMk id="9" creationId="{2F53B92C-69A1-8B0B-7882-0A3FC44BCAF5}"/>
+          </ac:spMkLst>
+        </pc:spChg>
+        <pc:spChg chg="add mod">
+          <ac:chgData name="Dave H" userId="6e4cc4a2bf18343d" providerId="LiveId" clId="{EC46B084-59D0-4F2D-947D-5BCE3BE97355}" dt="2025-06-11T00:29:49.246" v="552" actId="1076"/>
+          <ac:spMkLst>
+            <pc:docMk/>
+            <pc:sldMk cId="3217958544" sldId="262"/>
+            <ac:spMk id="12" creationId="{4E997A89-02D8-8069-E5F8-B3D011A44543}"/>
+          </ac:spMkLst>
+        </pc:spChg>
+        <pc:picChg chg="add del">
+          <ac:chgData name="Dave H" userId="6e4cc4a2bf18343d" providerId="LiveId" clId="{EC46B084-59D0-4F2D-947D-5BCE3BE97355}" dt="2025-06-11T00:16:48.293" v="453" actId="22"/>
+          <ac:picMkLst>
+            <pc:docMk/>
+            <pc:sldMk cId="3217958544" sldId="262"/>
+            <ac:picMk id="6" creationId="{02513F02-09AD-7792-ADB0-DC79C19D308A}"/>
+          </ac:picMkLst>
+        </pc:picChg>
+        <pc:picChg chg="add mod">
+          <ac:chgData name="Dave H" userId="6e4cc4a2bf18343d" providerId="LiveId" clId="{EC46B084-59D0-4F2D-947D-5BCE3BE97355}" dt="2025-06-11T00:30:54.278" v="564" actId="1076"/>
+          <ac:picMkLst>
+            <pc:docMk/>
+            <pc:sldMk cId="3217958544" sldId="262"/>
+            <ac:picMk id="11" creationId="{18A412EF-B895-73F6-0CDB-36D0C8451BED}"/>
+          </ac:picMkLst>
+        </pc:picChg>
       </pc:sldChg>
     </pc:docChg>
   </pc:docChgLst>
@@ -518,7 +629,7 @@
           <a:p>
             <a:fld id="{79C5A860-F335-4252-AA00-24FB67ED2982}" type="datetime1">
               <a:rPr lang="en-US" smtClean="0"/>
-              <a:t>5/20/2025</a:t>
+              <a:t>6/10/2025</a:t>
             </a:fld>
             <a:endParaRPr lang="en-US"/>
           </a:p>
@@ -717,7 +828,7 @@
           <a:p>
             <a:fld id="{46AB1048-0047-48CA-88BA-D69B470942CF}" type="datetime1">
               <a:rPr lang="en-US" smtClean="0"/>
-              <a:t>5/20/2025</a:t>
+              <a:t>6/10/2025</a:t>
             </a:fld>
             <a:endParaRPr lang="en-US"/>
           </a:p>
@@ -927,7 +1038,7 @@
           <a:p>
             <a:fld id="{5BD83879-648C-49A9-81A2-0EF5946532D0}" type="datetime1">
               <a:rPr lang="en-US" smtClean="0"/>
-              <a:t>5/20/2025</a:t>
+              <a:t>6/10/2025</a:t>
             </a:fld>
             <a:endParaRPr lang="en-US"/>
           </a:p>
@@ -1125,7 +1236,7 @@
           <a:p>
             <a:fld id="{D04BC802-30E3-4658-9CCA-F873646FEC67}" type="datetime1">
               <a:rPr lang="en-US" smtClean="0"/>
-              <a:t>5/20/2025</a:t>
+              <a:t>6/10/2025</a:t>
             </a:fld>
             <a:endParaRPr lang="en-US"/>
           </a:p>
@@ -1403,7 +1514,7 @@
           <a:p>
             <a:fld id="{0AB227A3-19CE-4153-81CE-64EB7AB094B3}" type="datetime1">
               <a:rPr lang="en-US" smtClean="0"/>
-              <a:t>5/20/2025</a:t>
+              <a:t>6/10/2025</a:t>
             </a:fld>
             <a:endParaRPr lang="en-US"/>
           </a:p>
@@ -1670,7 +1781,7 @@
           <a:p>
             <a:fld id="{B819A100-10F6-477E-8847-29D479EF1C92}" type="datetime1">
               <a:rPr lang="en-US" smtClean="0"/>
-              <a:t>5/20/2025</a:t>
+              <a:t>6/10/2025</a:t>
             </a:fld>
             <a:endParaRPr lang="en-US"/>
           </a:p>
@@ -2084,7 +2195,7 @@
           <a:p>
             <a:fld id="{5DF128AB-198A-495F-8475-FDB360C9873F}" type="datetime1">
               <a:rPr lang="en-US" smtClean="0"/>
-              <a:t>5/20/2025</a:t>
+              <a:t>6/10/2025</a:t>
             </a:fld>
             <a:endParaRPr lang="en-US"/>
           </a:p>
@@ -2225,7 +2336,7 @@
           <a:p>
             <a:fld id="{021A235E-F8FD-479F-9FC7-18BE84110877}" type="datetime1">
               <a:rPr lang="en-US" smtClean="0"/>
-              <a:t>5/20/2025</a:t>
+              <a:t>6/10/2025</a:t>
             </a:fld>
             <a:endParaRPr lang="en-US"/>
           </a:p>
@@ -2338,7 +2449,7 @@
           <a:p>
             <a:fld id="{E890F09B-68DA-462E-9DB4-4C9ADAB8CBCC}" type="datetime1">
               <a:rPr lang="en-US" smtClean="0"/>
-              <a:t>5/20/2025</a:t>
+              <a:t>6/10/2025</a:t>
             </a:fld>
             <a:endParaRPr lang="en-US"/>
           </a:p>
@@ -2657,7 +2768,7 @@
           <a:p>
             <a:fld id="{17AC4E36-FABE-47EB-AA7F-C19A93824617}" type="datetime1">
               <a:rPr lang="en-US" smtClean="0"/>
-              <a:t>5/20/2025</a:t>
+              <a:t>6/10/2025</a:t>
             </a:fld>
             <a:endParaRPr lang="en-US"/>
           </a:p>
@@ -2954,7 +3065,7 @@
           <a:p>
             <a:fld id="{F199CE6B-5DE6-4A2D-B72E-5E8969F9F56F}" type="datetime1">
               <a:rPr lang="en-US" smtClean="0"/>
-              <a:t>5/20/2025</a:t>
+              <a:t>6/10/2025</a:t>
             </a:fld>
             <a:endParaRPr lang="en-US"/>
           </a:p>
@@ -3812,7 +3923,7 @@
           <a:p>
             <a:fld id="{F481A142-DA77-4A5F-AD1F-14E6C18F0F5F}" type="datetime1">
               <a:rPr lang="en-US" smtClean="0"/>
-              <a:t>5/20/2025</a:t>
+              <a:t>6/10/2025</a:t>
             </a:fld>
             <a:endParaRPr lang="en-US" dirty="0"/>
           </a:p>
@@ -5279,7 +5390,7 @@
         </p:blipFill>
         <p:spPr>
           <a:xfrm>
-            <a:off x="5843786" y="956797"/>
+            <a:off x="5474510" y="904043"/>
             <a:ext cx="6348214" cy="4612730"/>
           </a:xfrm>
           <a:prstGeom prst="rect">
@@ -5497,6 +5608,472 @@
       </p:grpSpPr>
       <p:sp>
         <p:nvSpPr>
+          <p:cNvPr id="4" name="Rectangle 3">
+            <a:extLst>
+              <a:ext uri="{FF2B5EF4-FFF2-40B4-BE49-F238E27FC236}">
+                <a16:creationId xmlns:a16="http://schemas.microsoft.com/office/drawing/2014/main" id="{BC6A284B-4D68-C738-0380-689D5C5D7F0D}"/>
+              </a:ext>
+            </a:extLst>
+          </p:cNvPr>
+          <p:cNvSpPr/>
+          <p:nvPr/>
+        </p:nvSpPr>
+        <p:spPr>
+          <a:xfrm>
+            <a:off x="0" y="6233823"/>
+            <a:ext cx="12192000" cy="624177"/>
+          </a:xfrm>
+          <a:prstGeom prst="rect">
+            <a:avLst/>
+          </a:prstGeom>
+          <a:solidFill>
+            <a:srgbClr val="FFFF00"/>
+          </a:solidFill>
+        </p:spPr>
+        <p:style>
+          <a:lnRef idx="2">
+            <a:schemeClr val="accent1">
+              <a:shade val="15000"/>
+            </a:schemeClr>
+          </a:lnRef>
+          <a:fillRef idx="1">
+            <a:schemeClr val="accent1"/>
+          </a:fillRef>
+          <a:effectRef idx="0">
+            <a:schemeClr val="accent1"/>
+          </a:effectRef>
+          <a:fontRef idx="minor">
+            <a:schemeClr val="lt1"/>
+          </a:fontRef>
+        </p:style>
+        <p:txBody>
+          <a:bodyPr rtlCol="0" anchor="ctr"/>
+          <a:lstStyle/>
+          <a:p>
+            <a:pPr algn="ctr"/>
+            <a:endParaRPr lang="en-US"/>
+          </a:p>
+        </p:txBody>
+      </p:sp>
+      <p:sp>
+        <p:nvSpPr>
+          <p:cNvPr id="9" name="TextBox 8">
+            <a:extLst>
+              <a:ext uri="{FF2B5EF4-FFF2-40B4-BE49-F238E27FC236}">
+                <a16:creationId xmlns:a16="http://schemas.microsoft.com/office/drawing/2014/main" id="{2F53B92C-69A1-8B0B-7882-0A3FC44BCAF5}"/>
+              </a:ext>
+            </a:extLst>
+          </p:cNvPr>
+          <p:cNvSpPr txBox="1"/>
+          <p:nvPr/>
+        </p:nvSpPr>
+        <p:spPr>
+          <a:xfrm>
+            <a:off x="61547" y="764024"/>
+            <a:ext cx="5459354" cy="5693866"/>
+          </a:xfrm>
+          <a:prstGeom prst="rect">
+            <a:avLst/>
+          </a:prstGeom>
+          <a:noFill/>
+        </p:spPr>
+        <p:txBody>
+          <a:bodyPr wrap="square">
+            <a:spAutoFit/>
+          </a:bodyPr>
+          <a:lstStyle/>
+          <a:p>
+            <a:pPr rtl="0"/>
+            <a:r>
+              <a:rPr lang="en-US" sz="1600" dirty="0"/>
+              <a:t>User Preference Survey: Collect preferences via in-app survey, implemented in 3 months with API integration.</a:t>
+            </a:r>
+            <a:br>
+              <a:rPr lang="en-US" sz="1600" dirty="0"/>
+            </a:br>
+            <a:r>
+              <a:rPr lang="en-US" sz="1400" dirty="0"/>
+              <a:t>Trade-off: 1% impression loss vs. </a:t>
+            </a:r>
+            <a:r>
+              <a:rPr lang="en-US" sz="1400" dirty="0">
+                <a:highlight>
+                  <a:srgbClr val="FFFF00"/>
+                </a:highlight>
+              </a:rPr>
+              <a:t>5–6% engagement lift. </a:t>
+            </a:r>
+          </a:p>
+          <a:p>
+            <a:pPr rtl="0"/>
+            <a:endParaRPr lang="en-US" sz="1600" dirty="0"/>
+          </a:p>
+          <a:p>
+            <a:pPr rtl="0"/>
+            <a:r>
+              <a:rPr lang="en-US" sz="1600" dirty="0"/>
+              <a:t>Frequency Caps: Limit ads to 1 per 5 Story Snaps and Chat sessions, rolled out in 2 months.</a:t>
+            </a:r>
+          </a:p>
+          <a:p>
+            <a:pPr rtl="0"/>
+            <a:r>
+              <a:rPr lang="en-US" sz="1400" dirty="0"/>
+              <a:t>Trade-off: 3% impression loss vs. 6% lift. </a:t>
+            </a:r>
+          </a:p>
+          <a:p>
+            <a:pPr rtl="0"/>
+            <a:endParaRPr lang="en-US" sz="1600" dirty="0"/>
+          </a:p>
+          <a:p>
+            <a:pPr rtl="0"/>
+            <a:r>
+              <a:rPr lang="en-US" sz="1600" dirty="0"/>
+              <a:t>Skippable Ads: Add 5-second skip option, deployed in 4 months. </a:t>
+            </a:r>
+          </a:p>
+          <a:p>
+            <a:pPr rtl="0"/>
+            <a:r>
+              <a:rPr lang="en-US" sz="1400" dirty="0"/>
+              <a:t>Trade-off: 3% loss vs. 5% lift. </a:t>
+            </a:r>
+          </a:p>
+          <a:p>
+            <a:pPr rtl="0"/>
+            <a:endParaRPr lang="en-US" sz="1400" dirty="0"/>
+          </a:p>
+          <a:p>
+            <a:r>
+              <a:rPr lang="en-US" sz="1400" dirty="0"/>
+              <a:t>Placement Redesign: Move ads to 'Sponsored' tab, implemented in 6 months. </a:t>
+            </a:r>
+          </a:p>
+          <a:p>
+            <a:r>
+              <a:rPr lang="en-US" sz="1200" dirty="0"/>
+              <a:t>Trade-off: 2–3% loss vs. 6% lift. </a:t>
+            </a:r>
+          </a:p>
+          <a:p>
+            <a:endParaRPr lang="en-US" sz="1400" dirty="0"/>
+          </a:p>
+          <a:p>
+            <a:r>
+              <a:rPr lang="en-US" sz="1400" dirty="0"/>
+              <a:t>Content Moderation: Use AI filters, launched in 8 months. </a:t>
+            </a:r>
+          </a:p>
+          <a:p>
+            <a:r>
+              <a:rPr lang="en-US" sz="1200" dirty="0"/>
+              <a:t>Trade-off: 2–3% loss vs. </a:t>
+            </a:r>
+            <a:r>
+              <a:rPr lang="en-US" sz="1200" dirty="0">
+                <a:highlight>
+                  <a:srgbClr val="FFFF00"/>
+                </a:highlight>
+              </a:rPr>
+              <a:t>8% lift</a:t>
+            </a:r>
+            <a:r>
+              <a:rPr lang="en-US" sz="1200" dirty="0"/>
+              <a:t>.</a:t>
+            </a:r>
+          </a:p>
+          <a:p>
+            <a:r>
+              <a:rPr lang="en-US" sz="1400" dirty="0"/>
+              <a:t> </a:t>
+            </a:r>
+          </a:p>
+          <a:p>
+            <a:r>
+              <a:rPr lang="en-US" sz="1400" dirty="0">
+                <a:highlight>
+                  <a:srgbClr val="FFFF00"/>
+                </a:highlight>
+              </a:rPr>
+              <a:t>Reduce complaints by 65%, </a:t>
+            </a:r>
+            <a:r>
+              <a:rPr lang="en-US" sz="1400" dirty="0"/>
+              <a:t>enhance AR Lenses (6.4x swipe-to-purchase), and achieve </a:t>
+            </a:r>
+            <a:r>
+              <a:rPr lang="en-US" sz="1400" dirty="0">
+                <a:highlight>
+                  <a:srgbClr val="FFFF00"/>
+                </a:highlight>
+              </a:rPr>
+              <a:t>100x ROI</a:t>
+            </a:r>
+            <a:r>
+              <a:rPr lang="en-US" sz="1400" dirty="0"/>
+              <a:t>. </a:t>
+            </a:r>
+          </a:p>
+          <a:p>
+            <a:endParaRPr lang="en-US" sz="1400" dirty="0"/>
+          </a:p>
+          <a:p>
+            <a:r>
+              <a:rPr lang="en-US" sz="1400" dirty="0"/>
+              <a:t>Net revenue: </a:t>
+            </a:r>
+            <a:r>
+              <a:rPr lang="en-US" sz="1400" dirty="0">
+                <a:highlight>
+                  <a:srgbClr val="FFFF00"/>
+                </a:highlight>
+              </a:rPr>
+              <a:t>$450M</a:t>
+            </a:r>
+            <a:r>
+              <a:rPr lang="en-US" sz="1400" dirty="0"/>
+              <a:t> ($160–177M from Content Moderation).</a:t>
+            </a:r>
+          </a:p>
+          <a:p>
+            <a:pPr rtl="0"/>
+            <a:endParaRPr lang="en-US" sz="1400" dirty="0"/>
+          </a:p>
+          <a:p>
+            <a:pPr rtl="0"/>
+            <a:endParaRPr lang="en-US" sz="1600" dirty="0"/>
+          </a:p>
+        </p:txBody>
+      </p:sp>
+      <p:pic>
+        <p:nvPicPr>
+          <p:cNvPr id="11" name="Picture 10">
+            <a:extLst>
+              <a:ext uri="{FF2B5EF4-FFF2-40B4-BE49-F238E27FC236}">
+                <a16:creationId xmlns:a16="http://schemas.microsoft.com/office/drawing/2014/main" id="{18A412EF-B895-73F6-0CDB-36D0C8451BED}"/>
+              </a:ext>
+            </a:extLst>
+          </p:cNvPr>
+          <p:cNvPicPr>
+            <a:picLocks noChangeAspect="1"/>
+          </p:cNvPicPr>
+          <p:nvPr/>
+        </p:nvPicPr>
+        <p:blipFill>
+          <a:blip r:embed="rId2"/>
+          <a:stretch>
+            <a:fillRect/>
+          </a:stretch>
+        </p:blipFill>
+        <p:spPr>
+          <a:xfrm>
+            <a:off x="5439826" y="1260412"/>
+            <a:ext cx="6752174" cy="3259267"/>
+          </a:xfrm>
+          <a:prstGeom prst="rect">
+            <a:avLst/>
+          </a:prstGeom>
+        </p:spPr>
+      </p:pic>
+      <p:sp>
+        <p:nvSpPr>
+          <p:cNvPr id="12" name="TextBox 11">
+            <a:extLst>
+              <a:ext uri="{FF2B5EF4-FFF2-40B4-BE49-F238E27FC236}">
+                <a16:creationId xmlns:a16="http://schemas.microsoft.com/office/drawing/2014/main" id="{4E997A89-02D8-8069-E5F8-B3D011A44543}"/>
+              </a:ext>
+            </a:extLst>
+          </p:cNvPr>
+          <p:cNvSpPr txBox="1"/>
+          <p:nvPr/>
+        </p:nvSpPr>
+        <p:spPr>
+          <a:xfrm>
+            <a:off x="0" y="117693"/>
+            <a:ext cx="4839786" cy="646331"/>
+          </a:xfrm>
+          <a:prstGeom prst="rect">
+            <a:avLst/>
+          </a:prstGeom>
+          <a:noFill/>
+        </p:spPr>
+        <p:txBody>
+          <a:bodyPr wrap="none" rtlCol="0">
+            <a:spAutoFit/>
+          </a:bodyPr>
+          <a:lstStyle/>
+          <a:p>
+            <a:r>
+              <a:rPr lang="en-US" sz="3600" b="1" dirty="0">
+                <a:latin typeface="+mj-lt"/>
+              </a:rPr>
+              <a:t>Implementation Plan</a:t>
+            </a:r>
+          </a:p>
+        </p:txBody>
+      </p:sp>
+    </p:spTree>
+    <p:extLst>
+      <p:ext uri="{BB962C8B-B14F-4D97-AF65-F5344CB8AC3E}">
+        <p14:creationId xmlns:p14="http://schemas.microsoft.com/office/powerpoint/2010/main" val="3217958544"/>
+      </p:ext>
+    </p:extLst>
+  </p:cSld>
+  <p:clrMapOvr>
+    <a:masterClrMapping/>
+  </p:clrMapOvr>
+  <p:timing>
+    <p:tnLst>
+      <p:par>
+        <p:cTn id="1" dur="indefinite" restart="never" nodeType="tmRoot">
+          <p:childTnLst>
+            <p:seq concurrent="1" nextAc="seek">
+              <p:cTn id="2" dur="indefinite" nodeType="mainSeq">
+                <p:childTnLst>
+                  <p:par>
+                    <p:cTn id="3" fill="hold">
+                      <p:stCondLst>
+                        <p:cond delay="indefinite"/>
+                      </p:stCondLst>
+                      <p:childTnLst>
+                        <p:par>
+                          <p:cTn id="4" fill="hold">
+                            <p:stCondLst>
+                              <p:cond delay="0"/>
+                            </p:stCondLst>
+                            <p:childTnLst>
+                              <p:par>
+                                <p:cTn id="5" presetID="2" presetClass="entr" presetSubtype="4" fill="hold" nodeType="clickEffect">
+                                  <p:stCondLst>
+                                    <p:cond delay="0"/>
+                                  </p:stCondLst>
+                                  <p:childTnLst>
+                                    <p:set>
+                                      <p:cBhvr>
+                                        <p:cTn id="6" dur="1" fill="hold">
+                                          <p:stCondLst>
+                                            <p:cond delay="0"/>
+                                          </p:stCondLst>
+                                        </p:cTn>
+                                        <p:tgtEl>
+                                          <p:spTgt spid="11"/>
+                                        </p:tgtEl>
+                                        <p:attrNameLst>
+                                          <p:attrName>style.visibility</p:attrName>
+                                        </p:attrNameLst>
+                                      </p:cBhvr>
+                                      <p:to>
+                                        <p:strVal val="visible"/>
+                                      </p:to>
+                                    </p:set>
+                                    <p:anim calcmode="lin" valueType="num">
+                                      <p:cBhvr additive="base">
+                                        <p:cTn id="7" dur="500" fill="hold"/>
+                                        <p:tgtEl>
+                                          <p:spTgt spid="11"/>
+                                        </p:tgtEl>
+                                        <p:attrNameLst>
+                                          <p:attrName>ppt_x</p:attrName>
+                                        </p:attrNameLst>
+                                      </p:cBhvr>
+                                      <p:tavLst>
+                                        <p:tav tm="0">
+                                          <p:val>
+                                            <p:strVal val="#ppt_x"/>
+                                          </p:val>
+                                        </p:tav>
+                                        <p:tav tm="100000">
+                                          <p:val>
+                                            <p:strVal val="#ppt_x"/>
+                                          </p:val>
+                                        </p:tav>
+                                      </p:tavLst>
+                                    </p:anim>
+                                    <p:anim calcmode="lin" valueType="num">
+                                      <p:cBhvr additive="base">
+                                        <p:cTn id="8" dur="500" fill="hold"/>
+                                        <p:tgtEl>
+                                          <p:spTgt spid="11"/>
+                                        </p:tgtEl>
+                                        <p:attrNameLst>
+                                          <p:attrName>ppt_y</p:attrName>
+                                        </p:attrNameLst>
+                                      </p:cBhvr>
+                                      <p:tavLst>
+                                        <p:tav tm="0">
+                                          <p:val>
+                                            <p:strVal val="1+#ppt_h/2"/>
+                                          </p:val>
+                                        </p:tav>
+                                        <p:tav tm="100000">
+                                          <p:val>
+                                            <p:strVal val="#ppt_y"/>
+                                          </p:val>
+                                        </p:tav>
+                                      </p:tavLst>
+                                    </p:anim>
+                                  </p:childTnLst>
+                                </p:cTn>
+                              </p:par>
+                            </p:childTnLst>
+                          </p:cTn>
+                        </p:par>
+                      </p:childTnLst>
+                    </p:cTn>
+                  </p:par>
+                </p:childTnLst>
+              </p:cTn>
+              <p:prevCondLst>
+                <p:cond evt="onPrev" delay="0">
+                  <p:tgtEl>
+                    <p:sldTgt/>
+                  </p:tgtEl>
+                </p:cond>
+              </p:prevCondLst>
+              <p:nextCondLst>
+                <p:cond evt="onNext" delay="0">
+                  <p:tgtEl>
+                    <p:sldTgt/>
+                  </p:tgtEl>
+                </p:cond>
+              </p:nextCondLst>
+            </p:seq>
+          </p:childTnLst>
+        </p:cTn>
+      </p:par>
+    </p:tnLst>
+  </p:timing>
+</p:sld>
+</file>
+
+<file path=ppt/slides/slide5.xml><?xml version="1.0" encoding="utf-8"?>
+<p:sld xmlns:a="http://schemas.openxmlformats.org/drawingml/2006/main" xmlns:r="http://schemas.openxmlformats.org/officeDocument/2006/relationships" xmlns:p="http://schemas.openxmlformats.org/presentationml/2006/main" showMasterSp="0">
+  <p:cSld>
+    <p:bg>
+      <p:bgPr>
+        <a:solidFill>
+          <a:schemeClr val="bg1"/>
+        </a:solidFill>
+        <a:effectLst/>
+      </p:bgPr>
+    </p:bg>
+    <p:spTree>
+      <p:nvGrpSpPr>
+        <p:cNvPr id="1" name=""/>
+        <p:cNvGrpSpPr/>
+        <p:nvPr/>
+      </p:nvGrpSpPr>
+      <p:grpSpPr>
+        <a:xfrm>
+          <a:off x="0" y="0"/>
+          <a:ext cx="0" cy="0"/>
+          <a:chOff x="0" y="0"/>
+          <a:chExt cx="0" cy="0"/>
+        </a:xfrm>
+      </p:grpSpPr>
+      <p:sp>
+        <p:nvSpPr>
           <p:cNvPr id="2" name="Title 1">
             <a:extLst>
               <a:ext uri="{FF2B5EF4-FFF2-40B4-BE49-F238E27FC236}">
@@ -5846,7 +6423,547 @@
 </p:sld>
 </file>
 
-<file path=ppt/slides/slide5.xml><?xml version="1.0" encoding="utf-8"?>
+<file path=ppt/slides/slide6.xml><?xml version="1.0" encoding="utf-8"?>
+<p:sld xmlns:a="http://schemas.openxmlformats.org/drawingml/2006/main" xmlns:r="http://schemas.openxmlformats.org/officeDocument/2006/relationships" xmlns:p="http://schemas.openxmlformats.org/presentationml/2006/main" showMasterSp="0">
+  <p:cSld>
+    <p:bg>
+      <p:bgPr>
+        <a:solidFill>
+          <a:schemeClr val="bg1"/>
+        </a:solidFill>
+        <a:effectLst/>
+      </p:bgPr>
+    </p:bg>
+    <p:spTree>
+      <p:nvGrpSpPr>
+        <p:cNvPr id="1" name=""/>
+        <p:cNvGrpSpPr/>
+        <p:nvPr/>
+      </p:nvGrpSpPr>
+      <p:grpSpPr>
+        <a:xfrm>
+          <a:off x="0" y="0"/>
+          <a:ext cx="0" cy="0"/>
+          <a:chOff x="0" y="0"/>
+          <a:chExt cx="0" cy="0"/>
+        </a:xfrm>
+      </p:grpSpPr>
+      <p:sp>
+        <p:nvSpPr>
+          <p:cNvPr id="2" name="Title 1">
+            <a:extLst>
+              <a:ext uri="{FF2B5EF4-FFF2-40B4-BE49-F238E27FC236}">
+                <a16:creationId xmlns:a16="http://schemas.microsoft.com/office/drawing/2014/main" id="{C5ECAA2F-6643-D354-4FDA-460322C740EF}"/>
+              </a:ext>
+            </a:extLst>
+          </p:cNvPr>
+          <p:cNvSpPr>
+            <a:spLocks noGrp="1"/>
+          </p:cNvSpPr>
+          <p:nvPr>
+            <p:ph type="title"/>
+          </p:nvPr>
+        </p:nvSpPr>
+        <p:spPr>
+          <a:xfrm>
+            <a:off x="437072" y="229982"/>
+            <a:ext cx="5359879" cy="563650"/>
+          </a:xfrm>
+        </p:spPr>
+        <p:txBody>
+          <a:bodyPr>
+            <a:noAutofit/>
+          </a:bodyPr>
+          <a:lstStyle/>
+          <a:p>
+            <a:r>
+              <a:rPr lang="en-US" sz="3600" b="1" dirty="0"/>
+              <a:t>User Segments</a:t>
+            </a:r>
+          </a:p>
+        </p:txBody>
+      </p:sp>
+      <p:sp>
+        <p:nvSpPr>
+          <p:cNvPr id="4" name="Rectangle 3">
+            <a:extLst>
+              <a:ext uri="{FF2B5EF4-FFF2-40B4-BE49-F238E27FC236}">
+                <a16:creationId xmlns:a16="http://schemas.microsoft.com/office/drawing/2014/main" id="{11D9C691-50B9-3D28-15E1-C0A077FD3E4C}"/>
+              </a:ext>
+            </a:extLst>
+          </p:cNvPr>
+          <p:cNvSpPr/>
+          <p:nvPr/>
+        </p:nvSpPr>
+        <p:spPr>
+          <a:xfrm>
+            <a:off x="0" y="6233823"/>
+            <a:ext cx="12192000" cy="624177"/>
+          </a:xfrm>
+          <a:prstGeom prst="rect">
+            <a:avLst/>
+          </a:prstGeom>
+          <a:solidFill>
+            <a:srgbClr val="FFFF00"/>
+          </a:solidFill>
+        </p:spPr>
+        <p:style>
+          <a:lnRef idx="2">
+            <a:schemeClr val="accent1">
+              <a:shade val="15000"/>
+            </a:schemeClr>
+          </a:lnRef>
+          <a:fillRef idx="1">
+            <a:schemeClr val="accent1"/>
+          </a:fillRef>
+          <a:effectRef idx="0">
+            <a:schemeClr val="accent1"/>
+          </a:effectRef>
+          <a:fontRef idx="minor">
+            <a:schemeClr val="lt1"/>
+          </a:fontRef>
+        </p:style>
+        <p:txBody>
+          <a:bodyPr rtlCol="0" anchor="ctr"/>
+          <a:lstStyle/>
+          <a:p>
+            <a:pPr algn="ctr"/>
+            <a:endParaRPr lang="en-US"/>
+          </a:p>
+        </p:txBody>
+      </p:sp>
+      <p:pic>
+        <p:nvPicPr>
+          <p:cNvPr id="9" name="Picture 8">
+            <a:extLst>
+              <a:ext uri="{FF2B5EF4-FFF2-40B4-BE49-F238E27FC236}">
+                <a16:creationId xmlns:a16="http://schemas.microsoft.com/office/drawing/2014/main" id="{E19876F5-8638-8A47-AB5E-366C9D0DF2B0}"/>
+              </a:ext>
+            </a:extLst>
+          </p:cNvPr>
+          <p:cNvPicPr>
+            <a:picLocks noChangeAspect="1"/>
+          </p:cNvPicPr>
+          <p:nvPr/>
+        </p:nvPicPr>
+        <p:blipFill>
+          <a:blip r:embed="rId2"/>
+          <a:stretch>
+            <a:fillRect/>
+          </a:stretch>
+        </p:blipFill>
+        <p:spPr>
+          <a:xfrm>
+            <a:off x="437072" y="759752"/>
+            <a:ext cx="4825041" cy="2255519"/>
+          </a:xfrm>
+          <a:prstGeom prst="rect">
+            <a:avLst/>
+          </a:prstGeom>
+        </p:spPr>
+      </p:pic>
+      <p:sp>
+        <p:nvSpPr>
+          <p:cNvPr id="12" name="TextBox 11">
+            <a:extLst>
+              <a:ext uri="{FF2B5EF4-FFF2-40B4-BE49-F238E27FC236}">
+                <a16:creationId xmlns:a16="http://schemas.microsoft.com/office/drawing/2014/main" id="{F26DF9DC-CE5E-ABA5-660D-F0258AE6C592}"/>
+              </a:ext>
+            </a:extLst>
+          </p:cNvPr>
+          <p:cNvSpPr txBox="1"/>
+          <p:nvPr/>
+        </p:nvSpPr>
+        <p:spPr>
+          <a:xfrm>
+            <a:off x="437072" y="3441791"/>
+            <a:ext cx="3501280" cy="646331"/>
+          </a:xfrm>
+          <a:prstGeom prst="rect">
+            <a:avLst/>
+          </a:prstGeom>
+          <a:noFill/>
+        </p:spPr>
+        <p:txBody>
+          <a:bodyPr wrap="none" rtlCol="0">
+            <a:spAutoFit/>
+          </a:bodyPr>
+          <a:lstStyle/>
+          <a:p>
+            <a:r>
+              <a:rPr lang="en-US" sz="3600" b="1" dirty="0">
+                <a:latin typeface="+mj-lt"/>
+              </a:rPr>
+              <a:t>Success Matrix</a:t>
+            </a:r>
+          </a:p>
+        </p:txBody>
+      </p:sp>
+      <p:pic>
+        <p:nvPicPr>
+          <p:cNvPr id="14" name="Picture 13">
+            <a:extLst>
+              <a:ext uri="{FF2B5EF4-FFF2-40B4-BE49-F238E27FC236}">
+                <a16:creationId xmlns:a16="http://schemas.microsoft.com/office/drawing/2014/main" id="{038E826F-2DC5-B5CA-FA13-998FE2FA5767}"/>
+              </a:ext>
+            </a:extLst>
+          </p:cNvPr>
+          <p:cNvPicPr>
+            <a:picLocks noChangeAspect="1"/>
+          </p:cNvPicPr>
+          <p:nvPr/>
+        </p:nvPicPr>
+        <p:blipFill>
+          <a:blip r:embed="rId3"/>
+          <a:stretch>
+            <a:fillRect/>
+          </a:stretch>
+        </p:blipFill>
+        <p:spPr>
+          <a:xfrm>
+            <a:off x="531205" y="4088122"/>
+            <a:ext cx="3191320" cy="2057687"/>
+          </a:xfrm>
+          <a:prstGeom prst="rect">
+            <a:avLst/>
+          </a:prstGeom>
+        </p:spPr>
+      </p:pic>
+      <p:pic>
+        <p:nvPicPr>
+          <p:cNvPr id="16" name="Picture 15">
+            <a:extLst>
+              <a:ext uri="{FF2B5EF4-FFF2-40B4-BE49-F238E27FC236}">
+                <a16:creationId xmlns:a16="http://schemas.microsoft.com/office/drawing/2014/main" id="{B5F2E82F-B5AD-CEFE-6D52-3DCA58A85849}"/>
+              </a:ext>
+            </a:extLst>
+          </p:cNvPr>
+          <p:cNvPicPr>
+            <a:picLocks noChangeAspect="1"/>
+          </p:cNvPicPr>
+          <p:nvPr/>
+        </p:nvPicPr>
+        <p:blipFill>
+          <a:blip r:embed="rId4"/>
+          <a:stretch>
+            <a:fillRect/>
+          </a:stretch>
+        </p:blipFill>
+        <p:spPr>
+          <a:xfrm>
+            <a:off x="5374256" y="2877778"/>
+            <a:ext cx="6487476" cy="3035137"/>
+          </a:xfrm>
+          <a:prstGeom prst="rect">
+            <a:avLst/>
+          </a:prstGeom>
+          <a:ln w="127000" cap="rnd">
+            <a:solidFill>
+              <a:srgbClr val="FFFFFF"/>
+            </a:solidFill>
+          </a:ln>
+          <a:effectLst>
+            <a:outerShdw blurRad="76200" dist="95250" dir="10500000" sx="97000" sy="23000" kx="900000" algn="br" rotWithShape="0">
+              <a:srgbClr val="000000">
+                <a:alpha val="20000"/>
+              </a:srgbClr>
+            </a:outerShdw>
+          </a:effectLst>
+          <a:scene3d>
+            <a:camera prst="orthographicFront"/>
+            <a:lightRig rig="twoPt" dir="t">
+              <a:rot lat="0" lon="0" rev="7800000"/>
+            </a:lightRig>
+          </a:scene3d>
+          <a:sp3d contourW="6350">
+            <a:bevelT w="50800" h="16510"/>
+            <a:contourClr>
+              <a:srgbClr val="C0C0C0"/>
+            </a:contourClr>
+          </a:sp3d>
+        </p:spPr>
+      </p:pic>
+    </p:spTree>
+    <p:extLst>
+      <p:ext uri="{BB962C8B-B14F-4D97-AF65-F5344CB8AC3E}">
+        <p14:creationId xmlns:p14="http://schemas.microsoft.com/office/powerpoint/2010/main" val="1441263603"/>
+      </p:ext>
+    </p:extLst>
+  </p:cSld>
+  <p:clrMapOvr>
+    <a:masterClrMapping/>
+  </p:clrMapOvr>
+  <p:timing>
+    <p:tnLst>
+      <p:par>
+        <p:cTn id="1" dur="indefinite" restart="never" nodeType="tmRoot">
+          <p:childTnLst>
+            <p:seq concurrent="1" nextAc="seek">
+              <p:cTn id="2" dur="indefinite" nodeType="mainSeq">
+                <p:childTnLst>
+                  <p:par>
+                    <p:cTn id="3" fill="hold">
+                      <p:stCondLst>
+                        <p:cond delay="indefinite"/>
+                      </p:stCondLst>
+                      <p:childTnLst>
+                        <p:par>
+                          <p:cTn id="4" fill="hold">
+                            <p:stCondLst>
+                              <p:cond delay="0"/>
+                            </p:stCondLst>
+                            <p:childTnLst>
+                              <p:par>
+                                <p:cTn id="5" presetID="2" presetClass="entr" presetSubtype="4" fill="hold" nodeType="clickEffect">
+                                  <p:stCondLst>
+                                    <p:cond delay="0"/>
+                                  </p:stCondLst>
+                                  <p:childTnLst>
+                                    <p:set>
+                                      <p:cBhvr>
+                                        <p:cTn id="6" dur="1" fill="hold">
+                                          <p:stCondLst>
+                                            <p:cond delay="0"/>
+                                          </p:stCondLst>
+                                        </p:cTn>
+                                        <p:tgtEl>
+                                          <p:spTgt spid="9"/>
+                                        </p:tgtEl>
+                                        <p:attrNameLst>
+                                          <p:attrName>style.visibility</p:attrName>
+                                        </p:attrNameLst>
+                                      </p:cBhvr>
+                                      <p:to>
+                                        <p:strVal val="visible"/>
+                                      </p:to>
+                                    </p:set>
+                                    <p:anim calcmode="lin" valueType="num">
+                                      <p:cBhvr additive="base">
+                                        <p:cTn id="7" dur="500" fill="hold"/>
+                                        <p:tgtEl>
+                                          <p:spTgt spid="9"/>
+                                        </p:tgtEl>
+                                        <p:attrNameLst>
+                                          <p:attrName>ppt_x</p:attrName>
+                                        </p:attrNameLst>
+                                      </p:cBhvr>
+                                      <p:tavLst>
+                                        <p:tav tm="0">
+                                          <p:val>
+                                            <p:strVal val="#ppt_x"/>
+                                          </p:val>
+                                        </p:tav>
+                                        <p:tav tm="100000">
+                                          <p:val>
+                                            <p:strVal val="#ppt_x"/>
+                                          </p:val>
+                                        </p:tav>
+                                      </p:tavLst>
+                                    </p:anim>
+                                    <p:anim calcmode="lin" valueType="num">
+                                      <p:cBhvr additive="base">
+                                        <p:cTn id="8" dur="500" fill="hold"/>
+                                        <p:tgtEl>
+                                          <p:spTgt spid="9"/>
+                                        </p:tgtEl>
+                                        <p:attrNameLst>
+                                          <p:attrName>ppt_y</p:attrName>
+                                        </p:attrNameLst>
+                                      </p:cBhvr>
+                                      <p:tavLst>
+                                        <p:tav tm="0">
+                                          <p:val>
+                                            <p:strVal val="1+#ppt_h/2"/>
+                                          </p:val>
+                                        </p:tav>
+                                        <p:tav tm="100000">
+                                          <p:val>
+                                            <p:strVal val="#ppt_y"/>
+                                          </p:val>
+                                        </p:tav>
+                                      </p:tavLst>
+                                    </p:anim>
+                                  </p:childTnLst>
+                                </p:cTn>
+                              </p:par>
+                              <p:par>
+                                <p:cTn id="9" presetID="2" presetClass="entr" presetSubtype="4" fill="hold" nodeType="withEffect">
+                                  <p:stCondLst>
+                                    <p:cond delay="0"/>
+                                  </p:stCondLst>
+                                  <p:childTnLst>
+                                    <p:set>
+                                      <p:cBhvr>
+                                        <p:cTn id="10" dur="1" fill="hold">
+                                          <p:stCondLst>
+                                            <p:cond delay="0"/>
+                                          </p:stCondLst>
+                                        </p:cTn>
+                                        <p:tgtEl>
+                                          <p:spTgt spid="14"/>
+                                        </p:tgtEl>
+                                        <p:attrNameLst>
+                                          <p:attrName>style.visibility</p:attrName>
+                                        </p:attrNameLst>
+                                      </p:cBhvr>
+                                      <p:to>
+                                        <p:strVal val="visible"/>
+                                      </p:to>
+                                    </p:set>
+                                    <p:anim calcmode="lin" valueType="num">
+                                      <p:cBhvr additive="base">
+                                        <p:cTn id="11" dur="500" fill="hold"/>
+                                        <p:tgtEl>
+                                          <p:spTgt spid="14"/>
+                                        </p:tgtEl>
+                                        <p:attrNameLst>
+                                          <p:attrName>ppt_x</p:attrName>
+                                        </p:attrNameLst>
+                                      </p:cBhvr>
+                                      <p:tavLst>
+                                        <p:tav tm="0">
+                                          <p:val>
+                                            <p:strVal val="#ppt_x"/>
+                                          </p:val>
+                                        </p:tav>
+                                        <p:tav tm="100000">
+                                          <p:val>
+                                            <p:strVal val="#ppt_x"/>
+                                          </p:val>
+                                        </p:tav>
+                                      </p:tavLst>
+                                    </p:anim>
+                                    <p:anim calcmode="lin" valueType="num">
+                                      <p:cBhvr additive="base">
+                                        <p:cTn id="12" dur="500" fill="hold"/>
+                                        <p:tgtEl>
+                                          <p:spTgt spid="14"/>
+                                        </p:tgtEl>
+                                        <p:attrNameLst>
+                                          <p:attrName>ppt_y</p:attrName>
+                                        </p:attrNameLst>
+                                      </p:cBhvr>
+                                      <p:tavLst>
+                                        <p:tav tm="0">
+                                          <p:val>
+                                            <p:strVal val="1+#ppt_h/2"/>
+                                          </p:val>
+                                        </p:tav>
+                                        <p:tav tm="100000">
+                                          <p:val>
+                                            <p:strVal val="#ppt_y"/>
+                                          </p:val>
+                                        </p:tav>
+                                      </p:tavLst>
+                                    </p:anim>
+                                  </p:childTnLst>
+                                </p:cTn>
+                              </p:par>
+                              <p:par>
+                                <p:cTn id="13" presetID="2" presetClass="entr" presetSubtype="4" fill="hold" nodeType="withEffect">
+                                  <p:stCondLst>
+                                    <p:cond delay="0"/>
+                                  </p:stCondLst>
+                                  <p:childTnLst>
+                                    <p:set>
+                                      <p:cBhvr>
+                                        <p:cTn id="14" dur="1" fill="hold">
+                                          <p:stCondLst>
+                                            <p:cond delay="0"/>
+                                          </p:stCondLst>
+                                        </p:cTn>
+                                        <p:tgtEl>
+                                          <p:spTgt spid="16"/>
+                                        </p:tgtEl>
+                                        <p:attrNameLst>
+                                          <p:attrName>style.visibility</p:attrName>
+                                        </p:attrNameLst>
+                                      </p:cBhvr>
+                                      <p:to>
+                                        <p:strVal val="visible"/>
+                                      </p:to>
+                                    </p:set>
+                                    <p:anim calcmode="lin" valueType="num">
+                                      <p:cBhvr additive="base">
+                                        <p:cTn id="15" dur="500" fill="hold"/>
+                                        <p:tgtEl>
+                                          <p:spTgt spid="16"/>
+                                        </p:tgtEl>
+                                        <p:attrNameLst>
+                                          <p:attrName>ppt_x</p:attrName>
+                                        </p:attrNameLst>
+                                      </p:cBhvr>
+                                      <p:tavLst>
+                                        <p:tav tm="0">
+                                          <p:val>
+                                            <p:strVal val="#ppt_x"/>
+                                          </p:val>
+                                        </p:tav>
+                                        <p:tav tm="100000">
+                                          <p:val>
+                                            <p:strVal val="#ppt_x"/>
+                                          </p:val>
+                                        </p:tav>
+                                      </p:tavLst>
+                                    </p:anim>
+                                    <p:anim calcmode="lin" valueType="num">
+                                      <p:cBhvr additive="base">
+                                        <p:cTn id="16" dur="500" fill="hold"/>
+                                        <p:tgtEl>
+                                          <p:spTgt spid="16"/>
+                                        </p:tgtEl>
+                                        <p:attrNameLst>
+                                          <p:attrName>ppt_y</p:attrName>
+                                        </p:attrNameLst>
+                                      </p:cBhvr>
+                                      <p:tavLst>
+                                        <p:tav tm="0">
+                                          <p:val>
+                                            <p:strVal val="1+#ppt_h/2"/>
+                                          </p:val>
+                                        </p:tav>
+                                        <p:tav tm="100000">
+                                          <p:val>
+                                            <p:strVal val="#ppt_y"/>
+                                          </p:val>
+                                        </p:tav>
+                                      </p:tavLst>
+                                    </p:anim>
+                                  </p:childTnLst>
+                                </p:cTn>
+                              </p:par>
+                            </p:childTnLst>
+                          </p:cTn>
+                        </p:par>
+                      </p:childTnLst>
+                    </p:cTn>
+                  </p:par>
+                </p:childTnLst>
+              </p:cTn>
+              <p:prevCondLst>
+                <p:cond evt="onPrev" delay="0">
+                  <p:tgtEl>
+                    <p:sldTgt/>
+                  </p:tgtEl>
+                </p:cond>
+              </p:prevCondLst>
+              <p:nextCondLst>
+                <p:cond evt="onNext" delay="0">
+                  <p:tgtEl>
+                    <p:sldTgt/>
+                  </p:tgtEl>
+                </p:cond>
+              </p:nextCondLst>
+            </p:seq>
+          </p:childTnLst>
+        </p:cTn>
+      </p:par>
+    </p:tnLst>
+  </p:timing>
+</p:sld>
+</file>
+
+<file path=ppt/slides/slide7.xml><?xml version="1.0" encoding="utf-8"?>
 <p:sld xmlns:a="http://schemas.openxmlformats.org/drawingml/2006/main" xmlns:r="http://schemas.openxmlformats.org/officeDocument/2006/relationships" xmlns:p="http://schemas.openxmlformats.org/presentationml/2006/main" showMasterSp="0">
   <p:cSld>
     <p:bg>

</xml_diff>